<commit_message>
Fix bug: biyi kouyi use the same pic.
</commit_message>
<xml_diff>
--- a/images/process/process.pptx
+++ b/images/process/process.pptx
@@ -3506,7 +3506,7 @@
           <a:p>
             <a:fld id="{189242B5-CB5C-4B11-A48F-2B9A24490117}" type="datetimeFigureOut">
               <a:rPr lang="en-US" smtClean="0"/>
-              <a:t>7/11/2019</a:t>
+              <a:t>7/12/2019</a:t>
             </a:fld>
             <a:endParaRPr lang="en-US"/>
           </a:p>
@@ -3676,7 +3676,7 @@
           <a:p>
             <a:fld id="{189242B5-CB5C-4B11-A48F-2B9A24490117}" type="datetimeFigureOut">
               <a:rPr lang="en-US" smtClean="0"/>
-              <a:t>7/11/2019</a:t>
+              <a:t>7/12/2019</a:t>
             </a:fld>
             <a:endParaRPr lang="en-US"/>
           </a:p>
@@ -3856,7 +3856,7 @@
           <a:p>
             <a:fld id="{189242B5-CB5C-4B11-A48F-2B9A24490117}" type="datetimeFigureOut">
               <a:rPr lang="en-US" smtClean="0"/>
-              <a:t>7/11/2019</a:t>
+              <a:t>7/12/2019</a:t>
             </a:fld>
             <a:endParaRPr lang="en-US"/>
           </a:p>
@@ -4026,7 +4026,7 @@
           <a:p>
             <a:fld id="{189242B5-CB5C-4B11-A48F-2B9A24490117}" type="datetimeFigureOut">
               <a:rPr lang="en-US" smtClean="0"/>
-              <a:t>7/11/2019</a:t>
+              <a:t>7/12/2019</a:t>
             </a:fld>
             <a:endParaRPr lang="en-US"/>
           </a:p>
@@ -4270,7 +4270,7 @@
           <a:p>
             <a:fld id="{189242B5-CB5C-4B11-A48F-2B9A24490117}" type="datetimeFigureOut">
               <a:rPr lang="en-US" smtClean="0"/>
-              <a:t>7/11/2019</a:t>
+              <a:t>7/12/2019</a:t>
             </a:fld>
             <a:endParaRPr lang="en-US"/>
           </a:p>
@@ -4502,7 +4502,7 @@
           <a:p>
             <a:fld id="{189242B5-CB5C-4B11-A48F-2B9A24490117}" type="datetimeFigureOut">
               <a:rPr lang="en-US" smtClean="0"/>
-              <a:t>7/11/2019</a:t>
+              <a:t>7/12/2019</a:t>
             </a:fld>
             <a:endParaRPr lang="en-US"/>
           </a:p>
@@ -4869,7 +4869,7 @@
           <a:p>
             <a:fld id="{189242B5-CB5C-4B11-A48F-2B9A24490117}" type="datetimeFigureOut">
               <a:rPr lang="en-US" smtClean="0"/>
-              <a:t>7/11/2019</a:t>
+              <a:t>7/12/2019</a:t>
             </a:fld>
             <a:endParaRPr lang="en-US"/>
           </a:p>
@@ -4987,7 +4987,7 @@
           <a:p>
             <a:fld id="{189242B5-CB5C-4B11-A48F-2B9A24490117}" type="datetimeFigureOut">
               <a:rPr lang="en-US" smtClean="0"/>
-              <a:t>7/11/2019</a:t>
+              <a:t>7/12/2019</a:t>
             </a:fld>
             <a:endParaRPr lang="en-US"/>
           </a:p>
@@ -5082,7 +5082,7 @@
           <a:p>
             <a:fld id="{189242B5-CB5C-4B11-A48F-2B9A24490117}" type="datetimeFigureOut">
               <a:rPr lang="en-US" smtClean="0"/>
-              <a:t>7/11/2019</a:t>
+              <a:t>7/12/2019</a:t>
             </a:fld>
             <a:endParaRPr lang="en-US"/>
           </a:p>
@@ -5359,7 +5359,7 @@
           <a:p>
             <a:fld id="{189242B5-CB5C-4B11-A48F-2B9A24490117}" type="datetimeFigureOut">
               <a:rPr lang="en-US" smtClean="0"/>
-              <a:t>7/11/2019</a:t>
+              <a:t>7/12/2019</a:t>
             </a:fld>
             <a:endParaRPr lang="en-US"/>
           </a:p>
@@ -5616,7 +5616,7 @@
           <a:p>
             <a:fld id="{189242B5-CB5C-4B11-A48F-2B9A24490117}" type="datetimeFigureOut">
               <a:rPr lang="en-US" smtClean="0"/>
-              <a:t>7/11/2019</a:t>
+              <a:t>7/12/2019</a:t>
             </a:fld>
             <a:endParaRPr lang="en-US"/>
           </a:p>
@@ -5829,7 +5829,7 @@
           <a:p>
             <a:fld id="{189242B5-CB5C-4B11-A48F-2B9A24490117}" type="datetimeFigureOut">
               <a:rPr lang="en-US" smtClean="0"/>
-              <a:t>7/11/2019</a:t>
+              <a:t>7/12/2019</a:t>
             </a:fld>
             <a:endParaRPr lang="en-US"/>
           </a:p>
@@ -7760,7 +7760,7 @@
         </p:nvSpPr>
         <p:spPr>
           <a:xfrm>
-            <a:off x="207753" y="796613"/>
+            <a:off x="308420" y="905670"/>
             <a:ext cx="1415772" cy="404039"/>
           </a:xfrm>
           <a:prstGeom prst="foldedCorner">
@@ -7821,7 +7821,7 @@
         </p:nvSpPr>
         <p:spPr>
           <a:xfrm>
-            <a:off x="3393576" y="711484"/>
+            <a:off x="3494243" y="820541"/>
             <a:ext cx="1669047" cy="587693"/>
           </a:xfrm>
           <a:prstGeom prst="foldedCorner">
@@ -7907,7 +7907,7 @@
         </p:nvSpPr>
         <p:spPr>
           <a:xfrm>
-            <a:off x="6545610" y="795887"/>
+            <a:off x="6646277" y="904944"/>
             <a:ext cx="2031325" cy="404039"/>
           </a:xfrm>
           <a:prstGeom prst="foldedCorner">
@@ -7968,7 +7968,7 @@
         </p:nvSpPr>
         <p:spPr>
           <a:xfrm>
-            <a:off x="210814" y="2114378"/>
+            <a:off x="311481" y="2223435"/>
             <a:ext cx="1620957" cy="404039"/>
           </a:xfrm>
           <a:prstGeom prst="foldedCorner">
@@ -8029,7 +8029,7 @@
         </p:nvSpPr>
         <p:spPr>
           <a:xfrm>
-            <a:off x="2528325" y="2114378"/>
+            <a:off x="2628992" y="2223435"/>
             <a:ext cx="1005403" cy="404039"/>
           </a:xfrm>
           <a:prstGeom prst="foldedCorner">
@@ -8090,7 +8090,7 @@
         </p:nvSpPr>
         <p:spPr>
           <a:xfrm>
-            <a:off x="4228100" y="2114378"/>
+            <a:off x="4328767" y="2223435"/>
             <a:ext cx="1620957" cy="404039"/>
           </a:xfrm>
           <a:prstGeom prst="foldedCorner">
@@ -8151,7 +8151,7 @@
         </p:nvSpPr>
         <p:spPr>
           <a:xfrm>
-            <a:off x="6545611" y="2114378"/>
+            <a:off x="6646278" y="2223435"/>
             <a:ext cx="2031325" cy="404039"/>
           </a:xfrm>
           <a:prstGeom prst="foldedCorner">
@@ -8212,7 +8212,7 @@
         </p:nvSpPr>
         <p:spPr>
           <a:xfrm>
-            <a:off x="207753" y="3349054"/>
+            <a:off x="308420" y="3458111"/>
             <a:ext cx="595035" cy="404039"/>
           </a:xfrm>
           <a:prstGeom prst="foldedCorner">
@@ -8273,7 +8273,7 @@
         </p:nvSpPr>
         <p:spPr>
           <a:xfrm>
-            <a:off x="2389164" y="3349054"/>
+            <a:off x="2489831" y="3458111"/>
             <a:ext cx="1005403" cy="404039"/>
           </a:xfrm>
           <a:prstGeom prst="foldedCorner">
@@ -8334,7 +8334,7 @@
         </p:nvSpPr>
         <p:spPr>
           <a:xfrm>
-            <a:off x="4975586" y="3351096"/>
+            <a:off x="5076253" y="3460153"/>
             <a:ext cx="1005403" cy="404039"/>
           </a:xfrm>
           <a:prstGeom prst="foldedCorner">
@@ -8395,7 +8395,7 @@
         </p:nvSpPr>
         <p:spPr>
           <a:xfrm>
-            <a:off x="7562007" y="3349054"/>
+            <a:off x="7662674" y="3458111"/>
             <a:ext cx="1005403" cy="404039"/>
           </a:xfrm>
           <a:prstGeom prst="foldedCorner">
@@ -8458,7 +8458,7 @@
         </p:nvCxnSpPr>
         <p:spPr>
           <a:xfrm>
-            <a:off x="1623525" y="998633"/>
+            <a:off x="1724192" y="1107690"/>
             <a:ext cx="1770051" cy="6698"/>
           </a:xfrm>
           <a:prstGeom prst="straightConnector1">
@@ -8504,7 +8504,7 @@
         </p:nvCxnSpPr>
         <p:spPr>
           <a:xfrm flipV="1">
-            <a:off x="5062623" y="997907"/>
+            <a:off x="5163290" y="1106964"/>
             <a:ext cx="1482987" cy="7424"/>
           </a:xfrm>
           <a:prstGeom prst="straightConnector1">
@@ -8550,7 +8550,7 @@
         </p:nvCxnSpPr>
         <p:spPr>
           <a:xfrm>
-            <a:off x="3533728" y="2316398"/>
+            <a:off x="3634395" y="2425455"/>
             <a:ext cx="694372" cy="0"/>
           </a:xfrm>
           <a:prstGeom prst="straightConnector1">
@@ -8596,7 +8596,7 @@
         </p:nvCxnSpPr>
         <p:spPr>
           <a:xfrm>
-            <a:off x="5849057" y="2316398"/>
+            <a:off x="5949724" y="2425455"/>
             <a:ext cx="696554" cy="0"/>
           </a:xfrm>
           <a:prstGeom prst="straightConnector1">
@@ -8642,7 +8642,7 @@
         </p:nvCxnSpPr>
         <p:spPr>
           <a:xfrm>
-            <a:off x="802788" y="3551074"/>
+            <a:off x="903455" y="3660131"/>
             <a:ext cx="1586376" cy="0"/>
           </a:xfrm>
           <a:prstGeom prst="straightConnector1">
@@ -8688,7 +8688,7 @@
         </p:nvCxnSpPr>
         <p:spPr>
           <a:xfrm rot="5400000">
-            <a:off x="3617955" y="-594266"/>
+            <a:off x="3718622" y="-485209"/>
             <a:ext cx="830637" cy="7056003"/>
           </a:xfrm>
           <a:prstGeom prst="bentConnector3">
@@ -8736,7 +8736,7 @@
         </p:nvCxnSpPr>
         <p:spPr>
           <a:xfrm>
-            <a:off x="3394567" y="3551074"/>
+            <a:off x="3495234" y="3660131"/>
             <a:ext cx="1581019" cy="2042"/>
           </a:xfrm>
           <a:prstGeom prst="straightConnector1">
@@ -8782,7 +8782,7 @@
         </p:nvCxnSpPr>
         <p:spPr>
           <a:xfrm flipV="1">
-            <a:off x="5980989" y="3551074"/>
+            <a:off x="6081656" y="3660131"/>
             <a:ext cx="1581018" cy="2042"/>
           </a:xfrm>
           <a:prstGeom prst="straightConnector1">
@@ -8828,7 +8828,7 @@
         </p:nvCxnSpPr>
         <p:spPr>
           <a:xfrm rot="5400000">
-            <a:off x="3834057" y="-1612838"/>
+            <a:off x="3934724" y="-1503781"/>
             <a:ext cx="914452" cy="6539980"/>
           </a:xfrm>
           <a:prstGeom prst="bentConnector3">
@@ -8876,7 +8876,7 @@
         </p:nvCxnSpPr>
         <p:spPr>
           <a:xfrm>
-            <a:off x="1831771" y="2316398"/>
+            <a:off x="1932438" y="2425455"/>
             <a:ext cx="696554" cy="0"/>
           </a:xfrm>
           <a:prstGeom prst="straightConnector1">

</xml_diff>